<commit_message>
Add the Poster picture
</commit_message>
<xml_diff>
--- a/SCARA ARM Poster Presentation.pptx
+++ b/SCARA ARM Poster Presentation.pptx
@@ -126,14 +126,33 @@
 </p:presentation>
 </file>
 
-<file path=ppt/revisionInfo.xml><?xml version="1.0" encoding="utf-8"?>
-<p1510:revInfo xmlns:a="http://schemas.openxmlformats.org/drawingml/2006/main" xmlns:r="http://schemas.openxmlformats.org/officeDocument/2006/relationships" xmlns:p1510="http://schemas.microsoft.com/office/powerpoint/2015/10/main">
-  <p1510:revLst>
-    <p1510:client id="{2AE8FB93-10E0-EADC-8943-9AFD9FAA011E}" v="117" dt="2025-11-17T09:03:00.691"/>
-    <p1510:client id="{8FFDDFF3-CB39-3041-B630-36CA785552BA}" v="1295" dt="2025-11-17T08:04:27.804"/>
-    <p1510:client id="{C7EF8209-C169-A9A9-F8C7-E808DA08DFA7}" v="943" dt="2025-11-17T10:52:44.819"/>
-  </p1510:revLst>
-</p1510:revInfo>
+<file path=ppt/changesInfos/changesInfo1.xml><?xml version="1.0" encoding="utf-8"?>
+<pc:chgInfo xmlns:a="http://schemas.openxmlformats.org/drawingml/2006/main" xmlns:r="http://schemas.openxmlformats.org/officeDocument/2006/relationships" xmlns:ac="http://schemas.microsoft.com/office/drawing/2013/main/command" xmlns:pc="http://schemas.microsoft.com/office/powerpoint/2013/main/command">
+  <pc:docChgLst>
+    <pc:chgData name="Nhat Ha Pham" userId="b3ed5c50-fdfc-4a9c-804c-64eafe27d195" providerId="ADAL" clId="{43588C27-E3B8-4C1B-8C60-C4671A917AB3}"/>
+    <pc:docChg chg="modSld">
+      <pc:chgData name="Nhat Ha Pham" userId="b3ed5c50-fdfc-4a9c-804c-64eafe27d195" providerId="ADAL" clId="{43588C27-E3B8-4C1B-8C60-C4671A917AB3}" dt="2025-12-18T11:31:58.453" v="12" actId="20577"/>
+      <pc:docMkLst>
+        <pc:docMk/>
+      </pc:docMkLst>
+      <pc:sldChg chg="modSp mod">
+        <pc:chgData name="Nhat Ha Pham" userId="b3ed5c50-fdfc-4a9c-804c-64eafe27d195" providerId="ADAL" clId="{43588C27-E3B8-4C1B-8C60-C4671A917AB3}" dt="2025-12-18T11:31:58.453" v="12" actId="20577"/>
+        <pc:sldMkLst>
+          <pc:docMk/>
+          <pc:sldMk cId="993789709" sldId="256"/>
+        </pc:sldMkLst>
+        <pc:spChg chg="mod">
+          <ac:chgData name="Nhat Ha Pham" userId="b3ed5c50-fdfc-4a9c-804c-64eafe27d195" providerId="ADAL" clId="{43588C27-E3B8-4C1B-8C60-C4671A917AB3}" dt="2025-12-18T11:31:58.453" v="12" actId="20577"/>
+          <ac:spMkLst>
+            <pc:docMk/>
+            <pc:sldMk cId="993789709" sldId="256"/>
+            <ac:spMk id="23" creationId="{00000000-0000-0000-0000-000000000000}"/>
+          </ac:spMkLst>
+        </pc:spChg>
+      </pc:sldChg>
+    </pc:docChg>
+  </pc:docChgLst>
+</pc:chgInfo>
 </file>
 
 <file path=ppt/notesMasters/notesMaster1.xml><?xml version="1.0" encoding="utf-8"?>
@@ -219,7 +238,7 @@
             <a:fld id="{0F963DC8-CD53-4FF3-B7E9-6B7D524F603A}" type="datetimeFigureOut">
               <a:rPr lang="nl-NL" smtClean="0"/>
               <a:pPr/>
-              <a:t>17-11-2025</a:t>
+              <a:t>18-12-2025</a:t>
             </a:fld>
             <a:endParaRPr lang="nl-NL"/>
           </a:p>
@@ -752,7 +771,7 @@
             <a:fld id="{D90DBD5B-FF4A-402E-8A8A-983BFB505810}" type="datetime1">
               <a:rPr lang="nl-NL" smtClean="0"/>
               <a:pPr/>
-              <a:t>17-11-2025</a:t>
+              <a:t>18-12-2025</a:t>
             </a:fld>
             <a:endParaRPr lang="nl-NL"/>
           </a:p>
@@ -925,7 +944,7 @@
             <a:fld id="{D0A264A1-B203-42AA-9DD5-8C99FDEAFA44}" type="datetime1">
               <a:rPr lang="nl-NL" smtClean="0"/>
               <a:pPr/>
-              <a:t>17-11-2025</a:t>
+              <a:t>18-12-2025</a:t>
             </a:fld>
             <a:endParaRPr lang="nl-NL"/>
           </a:p>
@@ -1108,7 +1127,7 @@
             <a:fld id="{D68CB035-89A0-433A-9713-49BD7CBED8E3}" type="datetime1">
               <a:rPr lang="nl-NL" smtClean="0"/>
               <a:pPr/>
-              <a:t>17-11-2025</a:t>
+              <a:t>18-12-2025</a:t>
             </a:fld>
             <a:endParaRPr lang="nl-NL"/>
           </a:p>
@@ -1281,7 +1300,7 @@
             <a:fld id="{EE8C1BA0-96B8-4DE9-8EF7-6680FD9BFFD9}" type="datetime1">
               <a:rPr lang="nl-NL" smtClean="0"/>
               <a:pPr/>
-              <a:t>17-11-2025</a:t>
+              <a:t>18-12-2025</a:t>
             </a:fld>
             <a:endParaRPr lang="nl-NL"/>
           </a:p>
@@ -1531,7 +1550,7 @@
             <a:fld id="{A838540F-1CEC-4824-A90E-F2BCF9081926}" type="datetime1">
               <a:rPr lang="nl-NL" smtClean="0"/>
               <a:pPr/>
-              <a:t>17-11-2025</a:t>
+              <a:t>18-12-2025</a:t>
             </a:fld>
             <a:endParaRPr lang="nl-NL"/>
           </a:p>
@@ -1821,7 +1840,7 @@
             <a:fld id="{9DC7F459-FF75-4105-A523-AE31CD662C7D}" type="datetime1">
               <a:rPr lang="nl-NL" smtClean="0"/>
               <a:pPr/>
-              <a:t>17-11-2025</a:t>
+              <a:t>18-12-2025</a:t>
             </a:fld>
             <a:endParaRPr lang="nl-NL"/>
           </a:p>
@@ -2250,7 +2269,7 @@
             <a:fld id="{E5A43094-818F-4E76-BBFE-6657B786367C}" type="datetime1">
               <a:rPr lang="nl-NL" smtClean="0"/>
               <a:pPr/>
-              <a:t>17-11-2025</a:t>
+              <a:t>18-12-2025</a:t>
             </a:fld>
             <a:endParaRPr lang="nl-NL"/>
           </a:p>
@@ -2372,7 +2391,7 @@
             <a:fld id="{5ADB305B-01A1-4FEC-AE39-0AD513EA4569}" type="datetime1">
               <a:rPr lang="nl-NL" smtClean="0"/>
               <a:pPr/>
-              <a:t>17-11-2025</a:t>
+              <a:t>18-12-2025</a:t>
             </a:fld>
             <a:endParaRPr lang="nl-NL"/>
           </a:p>
@@ -2472,7 +2491,7 @@
             <a:fld id="{25EEC031-31BE-4039-B207-54D9DAE22726}" type="datetime1">
               <a:rPr lang="nl-NL" smtClean="0"/>
               <a:pPr/>
-              <a:t>17-11-2025</a:t>
+              <a:t>18-12-2025</a:t>
             </a:fld>
             <a:endParaRPr lang="nl-NL"/>
           </a:p>
@@ -2752,7 +2771,7 @@
             <a:fld id="{A4B1C866-3F76-4687-A1C3-62757EC48CB9}" type="datetime1">
               <a:rPr lang="nl-NL" smtClean="0"/>
               <a:pPr/>
-              <a:t>17-11-2025</a:t>
+              <a:t>18-12-2025</a:t>
             </a:fld>
             <a:endParaRPr lang="nl-NL"/>
           </a:p>
@@ -3012,7 +3031,7 @@
             <a:fld id="{35AA82EF-B0F9-4A43-A02F-003D2949500A}" type="datetime1">
               <a:rPr lang="nl-NL" smtClean="0"/>
               <a:pPr/>
-              <a:t>17-11-2025</a:t>
+              <a:t>18-12-2025</a:t>
             </a:fld>
             <a:endParaRPr lang="nl-NL"/>
           </a:p>
@@ -3228,7 +3247,7 @@
             <a:fld id="{93D918B5-2049-4DD6-89BD-103D0F8B031C}" type="datetime1">
               <a:rPr lang="nl-NL" smtClean="0"/>
               <a:pPr/>
-              <a:t>17-11-2025</a:t>
+              <a:t>18-12-2025</a:t>
             </a:fld>
             <a:endParaRPr lang="nl-NL"/>
           </a:p>
@@ -3791,7 +3810,7 @@
         <p:spPr bwMode="auto">
           <a:xfrm>
             <a:off x="780322" y="10127293"/>
-            <a:ext cx="13320000" cy="9510296"/>
+            <a:ext cx="13320000" cy="10064294"/>
           </a:xfrm>
           <a:prstGeom prst="rect">
             <a:avLst/>
@@ -3934,926 +3953,58 @@
           <a:p>
             <a:pPr algn="just" eaLnBrk="1" hangingPunct="1"/>
             <a:r>
+              <a:rPr lang="nl-NL" sz="3600" b="1" dirty="0">
+                <a:latin typeface="Arial"/>
+                <a:cs typeface="Arial"/>
+              </a:rPr>
+              <a:t>In order to achieve optimal results in modern agriculture, smart harvesting robots are the key to improve efficiency, reduce manual labor and waste. Using computer vision and sensors, the harvester can ensure optimal harvesting quality.</a:t>
+            </a:r>
+          </a:p>
+          <a:p>
+            <a:pPr algn="just" eaLnBrk="1" hangingPunct="1"/>
+            <a:endParaRPr lang="nl-NL" sz="3600" b="1" dirty="0">
+              <a:latin typeface="Arial"/>
+              <a:cs typeface="Arial"/>
+            </a:endParaRPr>
+          </a:p>
+          <a:p>
+            <a:pPr algn="just" eaLnBrk="1" hangingPunct="1"/>
+            <a:r>
               <a:rPr lang="nl-NL" sz="3600" b="1">
                 <a:latin typeface="Arial"/>
                 <a:cs typeface="Arial"/>
               </a:rPr>
-              <a:t>In order </a:t>
-            </a:r>
-            <a:r>
-              <a:rPr lang="nl-NL" sz="3600" b="1" err="1">
+              <a:t>The group is working </a:t>
+            </a:r>
+            <a:r>
+              <a:rPr lang="nl-NL" sz="3600" b="1" dirty="0">
                 <a:latin typeface="Arial"/>
                 <a:cs typeface="Arial"/>
               </a:rPr>
-              <a:t>to</a:t>
-            </a:r>
-            <a:r>
-              <a:rPr lang="nl-NL" sz="3600" b="1">
+              <a:t>on a fruit picking system that can detect the position and the ripeness of the fruit using a SCARA ARM Robot. Currently, we are working on designing the controller for all axis of the robot arm, researching sensors and looking for ways to implement these components.</a:t>
+            </a:r>
+          </a:p>
+          <a:p>
+            <a:pPr algn="just"/>
+            <a:endParaRPr lang="nl-NL" sz="3600" b="1" dirty="0">
+              <a:latin typeface="Arial"/>
+              <a:cs typeface="Arial"/>
+            </a:endParaRPr>
+          </a:p>
+          <a:p>
+            <a:pPr algn="just"/>
+            <a:r>
+              <a:rPr lang="nl-NL" sz="3600" b="1" dirty="0">
                 <a:latin typeface="Arial"/>
                 <a:cs typeface="Arial"/>
               </a:rPr>
-              <a:t> </a:t>
-            </a:r>
-            <a:r>
-              <a:rPr lang="nl-NL" sz="3600" b="1" err="1">
-                <a:latin typeface="Arial"/>
-                <a:cs typeface="Arial"/>
-              </a:rPr>
-              <a:t>achieve</a:t>
-            </a:r>
-            <a:r>
-              <a:rPr lang="nl-NL" sz="3600" b="1">
-                <a:latin typeface="Arial"/>
-                <a:cs typeface="Arial"/>
-              </a:rPr>
-              <a:t> </a:t>
-            </a:r>
-            <a:r>
-              <a:rPr lang="nl-NL" sz="3600" b="1" err="1">
-                <a:latin typeface="Arial"/>
-                <a:cs typeface="Arial"/>
-              </a:rPr>
-              <a:t>optimal</a:t>
-            </a:r>
-            <a:r>
-              <a:rPr lang="nl-NL" sz="3600" b="1">
-                <a:latin typeface="Arial"/>
-                <a:cs typeface="Arial"/>
-              </a:rPr>
-              <a:t> </a:t>
-            </a:r>
-            <a:r>
-              <a:rPr lang="nl-NL" sz="3600" b="1" err="1">
-                <a:latin typeface="Arial"/>
-                <a:cs typeface="Arial"/>
-              </a:rPr>
-              <a:t>results</a:t>
-            </a:r>
-            <a:r>
-              <a:rPr lang="nl-NL" sz="3600" b="1">
-                <a:latin typeface="Arial"/>
-                <a:cs typeface="Arial"/>
-              </a:rPr>
-              <a:t> in modern </a:t>
-            </a:r>
-            <a:r>
-              <a:rPr lang="nl-NL" sz="3600" b="1" err="1">
-                <a:latin typeface="Arial"/>
-                <a:cs typeface="Arial"/>
-              </a:rPr>
-              <a:t>agriculture</a:t>
-            </a:r>
-            <a:r>
-              <a:rPr lang="nl-NL" sz="3600" b="1">
-                <a:latin typeface="Arial"/>
-                <a:cs typeface="Arial"/>
-              </a:rPr>
-              <a:t>, smart </a:t>
-            </a:r>
-            <a:r>
-              <a:rPr lang="nl-NL" sz="3600" b="1" err="1">
-                <a:latin typeface="Arial"/>
-                <a:cs typeface="Arial"/>
-              </a:rPr>
-              <a:t>harvesting</a:t>
-            </a:r>
-            <a:r>
-              <a:rPr lang="nl-NL" sz="3600" b="1">
-                <a:latin typeface="Arial"/>
-                <a:cs typeface="Arial"/>
-              </a:rPr>
-              <a:t> robots are </a:t>
-            </a:r>
-            <a:r>
-              <a:rPr lang="nl-NL" sz="3600" b="1" err="1">
-                <a:latin typeface="Arial"/>
-                <a:cs typeface="Arial"/>
-              </a:rPr>
-              <a:t>the</a:t>
-            </a:r>
-            <a:r>
-              <a:rPr lang="nl-NL" sz="3600" b="1">
-                <a:latin typeface="Arial"/>
-                <a:cs typeface="Arial"/>
-              </a:rPr>
-              <a:t> </a:t>
-            </a:r>
-            <a:r>
-              <a:rPr lang="nl-NL" sz="3600" b="1" err="1">
-                <a:latin typeface="Arial"/>
-                <a:cs typeface="Arial"/>
-              </a:rPr>
-              <a:t>key</a:t>
-            </a:r>
-            <a:r>
-              <a:rPr lang="nl-NL" sz="3600" b="1">
-                <a:latin typeface="Arial"/>
-                <a:cs typeface="Arial"/>
-              </a:rPr>
-              <a:t> </a:t>
-            </a:r>
-            <a:r>
-              <a:rPr lang="nl-NL" sz="3600" b="1" err="1">
-                <a:latin typeface="Arial"/>
-                <a:cs typeface="Arial"/>
-              </a:rPr>
-              <a:t>to</a:t>
-            </a:r>
-            <a:r>
-              <a:rPr lang="nl-NL" sz="3600" b="1">
-                <a:latin typeface="Arial"/>
-                <a:cs typeface="Arial"/>
-              </a:rPr>
-              <a:t> </a:t>
-            </a:r>
-            <a:r>
-              <a:rPr lang="nl-NL" sz="3600" b="1" err="1">
-                <a:latin typeface="Arial"/>
-                <a:cs typeface="Arial"/>
-              </a:rPr>
-              <a:t>improve</a:t>
-            </a:r>
-            <a:r>
-              <a:rPr lang="nl-NL" sz="3600" b="1">
-                <a:latin typeface="Arial"/>
-                <a:cs typeface="Arial"/>
-              </a:rPr>
-              <a:t> efficiency, </a:t>
-            </a:r>
-            <a:r>
-              <a:rPr lang="nl-NL" sz="3600" b="1" err="1">
-                <a:latin typeface="Arial"/>
-                <a:cs typeface="Arial"/>
-              </a:rPr>
-              <a:t>reduce</a:t>
-            </a:r>
-            <a:r>
-              <a:rPr lang="nl-NL" sz="3600" b="1">
-                <a:latin typeface="Arial"/>
-                <a:cs typeface="Arial"/>
-              </a:rPr>
-              <a:t> manual </a:t>
-            </a:r>
-            <a:r>
-              <a:rPr lang="nl-NL" sz="3600" b="1" err="1">
-                <a:latin typeface="Arial"/>
-                <a:cs typeface="Arial"/>
-              </a:rPr>
-              <a:t>labor</a:t>
-            </a:r>
-            <a:r>
-              <a:rPr lang="nl-NL" sz="3600" b="1">
-                <a:latin typeface="Arial"/>
-                <a:cs typeface="Arial"/>
-              </a:rPr>
-              <a:t> </a:t>
-            </a:r>
-            <a:r>
-              <a:rPr lang="nl-NL" sz="3600" b="1" err="1">
-                <a:latin typeface="Arial"/>
-                <a:cs typeface="Arial"/>
-              </a:rPr>
-              <a:t>and</a:t>
-            </a:r>
-            <a:r>
-              <a:rPr lang="nl-NL" sz="3600" b="1">
-                <a:latin typeface="Arial"/>
-                <a:cs typeface="Arial"/>
-              </a:rPr>
-              <a:t> waste. Using computer </a:t>
-            </a:r>
-            <a:r>
-              <a:rPr lang="nl-NL" sz="3600" b="1" err="1">
-                <a:latin typeface="Arial"/>
-                <a:cs typeface="Arial"/>
-              </a:rPr>
-              <a:t>vision</a:t>
-            </a:r>
-            <a:r>
-              <a:rPr lang="nl-NL" sz="3600" b="1">
-                <a:latin typeface="Arial"/>
-                <a:cs typeface="Arial"/>
-              </a:rPr>
-              <a:t> </a:t>
-            </a:r>
-            <a:r>
-              <a:rPr lang="nl-NL" sz="3600" b="1" err="1">
-                <a:latin typeface="Arial"/>
-                <a:cs typeface="Arial"/>
-              </a:rPr>
-              <a:t>and</a:t>
-            </a:r>
-            <a:r>
-              <a:rPr lang="nl-NL" sz="3600" b="1">
-                <a:latin typeface="Arial"/>
-                <a:cs typeface="Arial"/>
-              </a:rPr>
-              <a:t> sensors, </a:t>
-            </a:r>
-            <a:r>
-              <a:rPr lang="nl-NL" sz="3600" b="1" err="1">
-                <a:latin typeface="Arial"/>
-                <a:cs typeface="Arial"/>
-              </a:rPr>
-              <a:t>the</a:t>
-            </a:r>
-            <a:r>
-              <a:rPr lang="nl-NL" sz="3600" b="1">
-                <a:latin typeface="Arial"/>
-                <a:cs typeface="Arial"/>
-              </a:rPr>
-              <a:t> </a:t>
-            </a:r>
-            <a:r>
-              <a:rPr lang="nl-NL" sz="3600" b="1" err="1">
-                <a:latin typeface="Arial"/>
-                <a:cs typeface="Arial"/>
-              </a:rPr>
-              <a:t>harvester</a:t>
-            </a:r>
-            <a:r>
-              <a:rPr lang="nl-NL" sz="3600" b="1">
-                <a:latin typeface="Arial"/>
-                <a:cs typeface="Arial"/>
-              </a:rPr>
-              <a:t> </a:t>
-            </a:r>
-            <a:r>
-              <a:rPr lang="nl-NL" sz="3600" b="1" err="1">
-                <a:latin typeface="Arial"/>
-                <a:cs typeface="Arial"/>
-              </a:rPr>
-              <a:t>can</a:t>
-            </a:r>
-            <a:r>
-              <a:rPr lang="nl-NL" sz="3600" b="1">
-                <a:latin typeface="Arial"/>
-                <a:cs typeface="Arial"/>
-              </a:rPr>
-              <a:t> </a:t>
-            </a:r>
-            <a:r>
-              <a:rPr lang="nl-NL" sz="3600" b="1" err="1">
-                <a:latin typeface="Arial"/>
-                <a:cs typeface="Arial"/>
-              </a:rPr>
-              <a:t>ensure</a:t>
-            </a:r>
-            <a:r>
-              <a:rPr lang="nl-NL" sz="3600" b="1">
-                <a:latin typeface="Arial"/>
-                <a:cs typeface="Arial"/>
-              </a:rPr>
-              <a:t> </a:t>
-            </a:r>
-            <a:r>
-              <a:rPr lang="nl-NL" sz="3600" b="1" err="1">
-                <a:latin typeface="Arial"/>
-                <a:cs typeface="Arial"/>
-              </a:rPr>
-              <a:t>optimal</a:t>
-            </a:r>
-            <a:r>
-              <a:rPr lang="nl-NL" sz="3600" b="1">
-                <a:latin typeface="Arial"/>
-                <a:cs typeface="Arial"/>
-              </a:rPr>
-              <a:t> </a:t>
-            </a:r>
-            <a:r>
-              <a:rPr lang="nl-NL" sz="3600" b="1" err="1">
-                <a:latin typeface="Arial"/>
-                <a:cs typeface="Arial"/>
-              </a:rPr>
-              <a:t>harvesting</a:t>
-            </a:r>
-            <a:r>
-              <a:rPr lang="nl-NL" sz="3600" b="1">
-                <a:latin typeface="Arial"/>
-                <a:cs typeface="Arial"/>
-              </a:rPr>
-              <a:t> </a:t>
-            </a:r>
-            <a:r>
-              <a:rPr lang="nl-NL" sz="3600" b="1" err="1">
-                <a:latin typeface="Arial"/>
-                <a:cs typeface="Arial"/>
-              </a:rPr>
-              <a:t>quality</a:t>
-            </a:r>
-            <a:r>
-              <a:rPr lang="nl-NL" sz="3600" b="1">
-                <a:latin typeface="Arial"/>
-                <a:cs typeface="Arial"/>
-              </a:rPr>
-              <a:t>.</a:t>
+              <a:t>What makes this project challenging is learning new technologies such as EtherCAT slave controller, TwinCAT Beckhoff platform, and real-time implementation. </a:t>
             </a:r>
           </a:p>
           <a:p>
             <a:pPr algn="just" eaLnBrk="1" hangingPunct="1"/>
-            <a:endParaRPr lang="nl-NL" sz="3600" b="1">
-              <a:latin typeface="Arial"/>
-              <a:cs typeface="Arial"/>
-            </a:endParaRPr>
-          </a:p>
-          <a:p>
-            <a:pPr algn="just" eaLnBrk="1" hangingPunct="1"/>
-            <a:r>
-              <a:rPr lang="nl-NL" sz="3600" b="1">
-                <a:latin typeface="Arial"/>
-                <a:cs typeface="Arial"/>
-              </a:rPr>
-              <a:t>We are </a:t>
-            </a:r>
-            <a:r>
-              <a:rPr lang="nl-NL" sz="3600" b="1" err="1">
-                <a:latin typeface="Arial"/>
-                <a:cs typeface="Arial"/>
-              </a:rPr>
-              <a:t>working</a:t>
-            </a:r>
-            <a:r>
-              <a:rPr lang="nl-NL" sz="3600" b="1">
-                <a:latin typeface="Arial"/>
-                <a:cs typeface="Arial"/>
-              </a:rPr>
-              <a:t> on a fruit </a:t>
-            </a:r>
-            <a:r>
-              <a:rPr lang="nl-NL" sz="3600" b="1" err="1">
-                <a:latin typeface="Arial"/>
-                <a:cs typeface="Arial"/>
-              </a:rPr>
-              <a:t>picking</a:t>
-            </a:r>
-            <a:r>
-              <a:rPr lang="nl-NL" sz="3600" b="1">
-                <a:latin typeface="Arial"/>
-                <a:cs typeface="Arial"/>
-              </a:rPr>
-              <a:t> system </a:t>
-            </a:r>
-            <a:r>
-              <a:rPr lang="nl-NL" sz="3600" b="1" err="1">
-                <a:latin typeface="Arial"/>
-                <a:cs typeface="Arial"/>
-              </a:rPr>
-              <a:t>that</a:t>
-            </a:r>
-            <a:r>
-              <a:rPr lang="nl-NL" sz="3600" b="1">
-                <a:latin typeface="Arial"/>
-                <a:cs typeface="Arial"/>
-              </a:rPr>
-              <a:t> </a:t>
-            </a:r>
-            <a:r>
-              <a:rPr lang="nl-NL" sz="3600" b="1" err="1">
-                <a:latin typeface="Arial"/>
-                <a:cs typeface="Arial"/>
-              </a:rPr>
-              <a:t>can</a:t>
-            </a:r>
-            <a:r>
-              <a:rPr lang="nl-NL" sz="3600" b="1">
-                <a:latin typeface="Arial"/>
-                <a:cs typeface="Arial"/>
-              </a:rPr>
-              <a:t> </a:t>
-            </a:r>
-            <a:r>
-              <a:rPr lang="nl-NL" sz="3600" b="1" err="1">
-                <a:latin typeface="Arial"/>
-                <a:cs typeface="Arial"/>
-              </a:rPr>
-              <a:t>detect</a:t>
-            </a:r>
-            <a:r>
-              <a:rPr lang="nl-NL" sz="3600" b="1">
-                <a:latin typeface="Arial"/>
-                <a:cs typeface="Arial"/>
-              </a:rPr>
-              <a:t> </a:t>
-            </a:r>
-            <a:r>
-              <a:rPr lang="nl-NL" sz="3600" b="1" err="1">
-                <a:latin typeface="Arial"/>
-                <a:cs typeface="Arial"/>
-              </a:rPr>
-              <a:t>the</a:t>
-            </a:r>
-            <a:r>
-              <a:rPr lang="nl-NL" sz="3600" b="1">
-                <a:latin typeface="Arial"/>
-                <a:cs typeface="Arial"/>
-              </a:rPr>
-              <a:t> </a:t>
-            </a:r>
-            <a:r>
-              <a:rPr lang="nl-NL" sz="3600" b="1" err="1">
-                <a:latin typeface="Arial"/>
-                <a:cs typeface="Arial"/>
-              </a:rPr>
-              <a:t>position</a:t>
-            </a:r>
-            <a:r>
-              <a:rPr lang="nl-NL" sz="3600" b="1">
-                <a:latin typeface="Arial"/>
-                <a:cs typeface="Arial"/>
-              </a:rPr>
-              <a:t> </a:t>
-            </a:r>
-            <a:r>
-              <a:rPr lang="nl-NL" sz="3600" b="1" err="1">
-                <a:latin typeface="Arial"/>
-                <a:cs typeface="Arial"/>
-              </a:rPr>
-              <a:t>and</a:t>
-            </a:r>
-            <a:r>
-              <a:rPr lang="nl-NL" sz="3600" b="1">
-                <a:latin typeface="Arial"/>
-                <a:cs typeface="Arial"/>
-              </a:rPr>
-              <a:t> </a:t>
-            </a:r>
-            <a:r>
-              <a:rPr lang="nl-NL" sz="3600" b="1" err="1">
-                <a:latin typeface="Arial"/>
-                <a:cs typeface="Arial"/>
-              </a:rPr>
-              <a:t>the</a:t>
-            </a:r>
-            <a:r>
-              <a:rPr lang="nl-NL" sz="3600" b="1">
-                <a:latin typeface="Arial"/>
-                <a:cs typeface="Arial"/>
-              </a:rPr>
-              <a:t> </a:t>
-            </a:r>
-            <a:r>
-              <a:rPr lang="nl-NL" sz="3600" b="1" err="1">
-                <a:latin typeface="Arial"/>
-                <a:cs typeface="Arial"/>
-              </a:rPr>
-              <a:t>ripeness</a:t>
-            </a:r>
-            <a:r>
-              <a:rPr lang="nl-NL" sz="3600" b="1">
-                <a:latin typeface="Arial"/>
-                <a:cs typeface="Arial"/>
-              </a:rPr>
-              <a:t> of </a:t>
-            </a:r>
-            <a:r>
-              <a:rPr lang="nl-NL" sz="3600" b="1" err="1">
-                <a:latin typeface="Arial"/>
-                <a:cs typeface="Arial"/>
-              </a:rPr>
-              <a:t>the</a:t>
-            </a:r>
-            <a:r>
-              <a:rPr lang="nl-NL" sz="3600" b="1">
-                <a:latin typeface="Arial"/>
-                <a:cs typeface="Arial"/>
-              </a:rPr>
-              <a:t> fruit </a:t>
-            </a:r>
-            <a:r>
-              <a:rPr lang="nl-NL" sz="3600" b="1" err="1">
-                <a:latin typeface="Arial"/>
-                <a:cs typeface="Arial"/>
-              </a:rPr>
-              <a:t>using</a:t>
-            </a:r>
-            <a:r>
-              <a:rPr lang="nl-NL" sz="3600" b="1">
-                <a:latin typeface="Arial"/>
-                <a:cs typeface="Arial"/>
-              </a:rPr>
-              <a:t> a SCARA ARM Robot. </a:t>
-            </a:r>
-            <a:r>
-              <a:rPr lang="nl-NL" sz="3600" b="1" err="1">
-                <a:latin typeface="Arial"/>
-                <a:cs typeface="Arial"/>
-              </a:rPr>
-              <a:t>Currently</a:t>
-            </a:r>
-            <a:r>
-              <a:rPr lang="nl-NL" sz="3600" b="1">
-                <a:latin typeface="Arial"/>
-                <a:cs typeface="Arial"/>
-              </a:rPr>
-              <a:t>, we are </a:t>
-            </a:r>
-            <a:r>
-              <a:rPr lang="nl-NL" sz="3600" b="1" err="1">
-                <a:latin typeface="Arial"/>
-                <a:cs typeface="Arial"/>
-              </a:rPr>
-              <a:t>working</a:t>
-            </a:r>
-            <a:r>
-              <a:rPr lang="nl-NL" sz="3600" b="1">
-                <a:latin typeface="Arial"/>
-                <a:cs typeface="Arial"/>
-              </a:rPr>
-              <a:t> on </a:t>
-            </a:r>
-            <a:r>
-              <a:rPr lang="nl-NL" sz="3600" b="1" err="1">
-                <a:latin typeface="Arial"/>
-                <a:cs typeface="Arial"/>
-              </a:rPr>
-              <a:t>designing</a:t>
-            </a:r>
-            <a:r>
-              <a:rPr lang="nl-NL" sz="3600" b="1">
-                <a:latin typeface="Arial"/>
-                <a:cs typeface="Arial"/>
-              </a:rPr>
-              <a:t> </a:t>
-            </a:r>
-            <a:r>
-              <a:rPr lang="nl-NL" sz="3600" b="1" err="1">
-                <a:latin typeface="Arial"/>
-                <a:cs typeface="Arial"/>
-              </a:rPr>
-              <a:t>the</a:t>
-            </a:r>
-            <a:r>
-              <a:rPr lang="nl-NL" sz="3600" b="1">
-                <a:latin typeface="Arial"/>
-                <a:cs typeface="Arial"/>
-              </a:rPr>
-              <a:t> controller </a:t>
-            </a:r>
-            <a:r>
-              <a:rPr lang="nl-NL" sz="3600" b="1" err="1">
-                <a:latin typeface="Arial"/>
-                <a:cs typeface="Arial"/>
-              </a:rPr>
-              <a:t>for</a:t>
-            </a:r>
-            <a:r>
-              <a:rPr lang="nl-NL" sz="3600" b="1">
-                <a:latin typeface="Arial"/>
-                <a:cs typeface="Arial"/>
-              </a:rPr>
-              <a:t> </a:t>
-            </a:r>
-            <a:r>
-              <a:rPr lang="nl-NL" sz="3600" b="1" err="1">
-                <a:latin typeface="Arial"/>
-                <a:cs typeface="Arial"/>
-              </a:rPr>
-              <a:t>all</a:t>
-            </a:r>
-            <a:r>
-              <a:rPr lang="nl-NL" sz="3600" b="1">
-                <a:latin typeface="Arial"/>
-                <a:cs typeface="Arial"/>
-              </a:rPr>
-              <a:t> </a:t>
-            </a:r>
-            <a:r>
-              <a:rPr lang="nl-NL" sz="3600" b="1" err="1">
-                <a:latin typeface="Arial"/>
-                <a:cs typeface="Arial"/>
-              </a:rPr>
-              <a:t>axis</a:t>
-            </a:r>
-            <a:r>
-              <a:rPr lang="nl-NL" sz="3600" b="1">
-                <a:latin typeface="Arial"/>
-                <a:cs typeface="Arial"/>
-              </a:rPr>
-              <a:t> of </a:t>
-            </a:r>
-            <a:r>
-              <a:rPr lang="nl-NL" sz="3600" b="1" err="1">
-                <a:latin typeface="Arial"/>
-                <a:cs typeface="Arial"/>
-              </a:rPr>
-              <a:t>the</a:t>
-            </a:r>
-            <a:r>
-              <a:rPr lang="nl-NL" sz="3600" b="1">
-                <a:latin typeface="Arial"/>
-                <a:cs typeface="Arial"/>
-              </a:rPr>
-              <a:t> robot arm, </a:t>
-            </a:r>
-            <a:r>
-              <a:rPr lang="nl-NL" sz="3600" b="1" err="1">
-                <a:latin typeface="Arial"/>
-                <a:cs typeface="Arial"/>
-              </a:rPr>
-              <a:t>researching</a:t>
-            </a:r>
-            <a:r>
-              <a:rPr lang="nl-NL" sz="3600" b="1">
-                <a:latin typeface="Arial"/>
-                <a:cs typeface="Arial"/>
-              </a:rPr>
-              <a:t> sensors </a:t>
-            </a:r>
-            <a:r>
-              <a:rPr lang="nl-NL" sz="3600" b="1" err="1">
-                <a:latin typeface="Arial"/>
-                <a:cs typeface="Arial"/>
-              </a:rPr>
-              <a:t>and</a:t>
-            </a:r>
-            <a:r>
-              <a:rPr lang="nl-NL" sz="3600" b="1">
-                <a:latin typeface="Arial"/>
-                <a:cs typeface="Arial"/>
-              </a:rPr>
-              <a:t> </a:t>
-            </a:r>
-            <a:r>
-              <a:rPr lang="nl-NL" sz="3600" b="1" err="1">
-                <a:latin typeface="Arial"/>
-                <a:cs typeface="Arial"/>
-              </a:rPr>
-              <a:t>looking</a:t>
-            </a:r>
-            <a:r>
-              <a:rPr lang="nl-NL" sz="3600" b="1">
-                <a:latin typeface="Arial"/>
-                <a:cs typeface="Arial"/>
-              </a:rPr>
-              <a:t> </a:t>
-            </a:r>
-            <a:r>
-              <a:rPr lang="nl-NL" sz="3600" b="1" err="1">
-                <a:latin typeface="Arial"/>
-                <a:cs typeface="Arial"/>
-              </a:rPr>
-              <a:t>for</a:t>
-            </a:r>
-            <a:r>
-              <a:rPr lang="nl-NL" sz="3600" b="1">
-                <a:latin typeface="Arial"/>
-                <a:cs typeface="Arial"/>
-              </a:rPr>
-              <a:t> </a:t>
-            </a:r>
-            <a:r>
-              <a:rPr lang="nl-NL" sz="3600" b="1" err="1">
-                <a:latin typeface="Arial"/>
-                <a:cs typeface="Arial"/>
-              </a:rPr>
-              <a:t>ways</a:t>
-            </a:r>
-            <a:r>
-              <a:rPr lang="nl-NL" sz="3600" b="1">
-                <a:latin typeface="Arial"/>
-                <a:cs typeface="Arial"/>
-              </a:rPr>
-              <a:t> </a:t>
-            </a:r>
-            <a:r>
-              <a:rPr lang="nl-NL" sz="3600" b="1" err="1">
-                <a:latin typeface="Arial"/>
-                <a:cs typeface="Arial"/>
-              </a:rPr>
-              <a:t>to</a:t>
-            </a:r>
-            <a:r>
-              <a:rPr lang="nl-NL" sz="3600" b="1">
-                <a:latin typeface="Arial"/>
-                <a:cs typeface="Arial"/>
-              </a:rPr>
-              <a:t> </a:t>
-            </a:r>
-            <a:r>
-              <a:rPr lang="nl-NL" sz="3600" b="1" err="1">
-                <a:latin typeface="Arial"/>
-                <a:cs typeface="Arial"/>
-              </a:rPr>
-              <a:t>implement</a:t>
-            </a:r>
-            <a:r>
-              <a:rPr lang="nl-NL" sz="3600" b="1">
-                <a:latin typeface="Arial"/>
-                <a:cs typeface="Arial"/>
-              </a:rPr>
-              <a:t> these </a:t>
-            </a:r>
-            <a:r>
-              <a:rPr lang="nl-NL" sz="3600" b="1" err="1">
-                <a:latin typeface="Arial"/>
-                <a:cs typeface="Arial"/>
-              </a:rPr>
-              <a:t>components</a:t>
-            </a:r>
-            <a:r>
-              <a:rPr lang="nl-NL" sz="3600" b="1">
-                <a:latin typeface="Arial"/>
-                <a:cs typeface="Arial"/>
-              </a:rPr>
-              <a:t>.</a:t>
-            </a:r>
-          </a:p>
-          <a:p>
-            <a:pPr algn="just"/>
-            <a:endParaRPr lang="nl-NL" sz="3600" b="1">
-              <a:latin typeface="Arial"/>
-              <a:cs typeface="Arial"/>
-            </a:endParaRPr>
-          </a:p>
-          <a:p>
-            <a:pPr algn="just"/>
-            <a:r>
-              <a:rPr lang="nl-NL" sz="3600" b="1" err="1">
-                <a:latin typeface="Arial"/>
-                <a:cs typeface="Arial"/>
-              </a:rPr>
-              <a:t>What</a:t>
-            </a:r>
-            <a:r>
-              <a:rPr lang="nl-NL" sz="3600" b="1">
-                <a:latin typeface="Arial"/>
-                <a:cs typeface="Arial"/>
-              </a:rPr>
-              <a:t> </a:t>
-            </a:r>
-            <a:r>
-              <a:rPr lang="nl-NL" sz="3600" b="1" err="1">
-                <a:latin typeface="Arial"/>
-                <a:cs typeface="Arial"/>
-              </a:rPr>
-              <a:t>makes</a:t>
-            </a:r>
-            <a:r>
-              <a:rPr lang="nl-NL" sz="3600" b="1">
-                <a:latin typeface="Arial"/>
-                <a:cs typeface="Arial"/>
-              </a:rPr>
-              <a:t> </a:t>
-            </a:r>
-            <a:r>
-              <a:rPr lang="nl-NL" sz="3600" b="1" err="1">
-                <a:latin typeface="Arial"/>
-                <a:cs typeface="Arial"/>
-              </a:rPr>
-              <a:t>this</a:t>
-            </a:r>
-            <a:r>
-              <a:rPr lang="nl-NL" sz="3600" b="1">
-                <a:latin typeface="Arial"/>
-                <a:cs typeface="Arial"/>
-              </a:rPr>
-              <a:t> project </a:t>
-            </a:r>
-            <a:r>
-              <a:rPr lang="nl-NL" sz="3600" b="1" err="1">
-                <a:latin typeface="Arial"/>
-                <a:cs typeface="Arial"/>
-              </a:rPr>
-              <a:t>challenging</a:t>
-            </a:r>
-            <a:r>
-              <a:rPr lang="nl-NL" sz="3600" b="1">
-                <a:latin typeface="Arial"/>
-                <a:cs typeface="Arial"/>
-              </a:rPr>
-              <a:t> is </a:t>
-            </a:r>
-            <a:r>
-              <a:rPr lang="nl-NL" sz="3600" b="1" err="1">
-                <a:latin typeface="Arial"/>
-                <a:cs typeface="Arial"/>
-              </a:rPr>
-              <a:t>learning</a:t>
-            </a:r>
-            <a:r>
-              <a:rPr lang="nl-NL" sz="3600" b="1">
-                <a:latin typeface="Arial"/>
-                <a:cs typeface="Arial"/>
-              </a:rPr>
-              <a:t> new </a:t>
-            </a:r>
-            <a:r>
-              <a:rPr lang="nl-NL" sz="3600" b="1" err="1">
-                <a:latin typeface="Arial"/>
-                <a:cs typeface="Arial"/>
-              </a:rPr>
-              <a:t>technologies</a:t>
-            </a:r>
-            <a:r>
-              <a:rPr lang="nl-NL" sz="3600" b="1">
-                <a:latin typeface="Arial"/>
-                <a:cs typeface="Arial"/>
-              </a:rPr>
-              <a:t> </a:t>
-            </a:r>
-            <a:r>
-              <a:rPr lang="nl-NL" sz="3600" b="1" err="1">
-                <a:latin typeface="Arial"/>
-                <a:cs typeface="Arial"/>
-              </a:rPr>
-              <a:t>such</a:t>
-            </a:r>
-            <a:r>
-              <a:rPr lang="nl-NL" sz="3600" b="1">
-                <a:latin typeface="Arial"/>
-                <a:cs typeface="Arial"/>
-              </a:rPr>
-              <a:t> as </a:t>
-            </a:r>
-            <a:r>
-              <a:rPr lang="nl-NL" sz="3600" b="1" err="1">
-                <a:latin typeface="Arial"/>
-                <a:cs typeface="Arial"/>
-              </a:rPr>
-              <a:t>EtherCAT</a:t>
-            </a:r>
-            <a:r>
-              <a:rPr lang="nl-NL" sz="3600" b="1">
-                <a:latin typeface="Arial"/>
-                <a:cs typeface="Arial"/>
-              </a:rPr>
-              <a:t> </a:t>
-            </a:r>
-            <a:r>
-              <a:rPr lang="nl-NL" sz="3600" b="1" err="1">
-                <a:latin typeface="Arial"/>
-                <a:cs typeface="Arial"/>
-              </a:rPr>
-              <a:t>slave</a:t>
-            </a:r>
-            <a:r>
-              <a:rPr lang="nl-NL" sz="3600" b="1">
-                <a:latin typeface="Arial"/>
-                <a:cs typeface="Arial"/>
-              </a:rPr>
-              <a:t> controller, </a:t>
-            </a:r>
-            <a:r>
-              <a:rPr lang="nl-NL" sz="3600" b="1" err="1">
-                <a:latin typeface="Arial"/>
-                <a:cs typeface="Arial"/>
-              </a:rPr>
-              <a:t>TwinCAT</a:t>
-            </a:r>
-            <a:r>
-              <a:rPr lang="nl-NL" sz="3600" b="1">
-                <a:latin typeface="Arial"/>
-                <a:cs typeface="Arial"/>
-              </a:rPr>
-              <a:t> </a:t>
-            </a:r>
-            <a:r>
-              <a:rPr lang="nl-NL" sz="3600" b="1" err="1">
-                <a:latin typeface="Arial"/>
-                <a:cs typeface="Arial"/>
-              </a:rPr>
-              <a:t>Beckhoff</a:t>
-            </a:r>
-            <a:r>
-              <a:rPr lang="nl-NL" sz="3600" b="1">
-                <a:latin typeface="Arial"/>
-                <a:cs typeface="Arial"/>
-              </a:rPr>
-              <a:t> platform, </a:t>
-            </a:r>
-            <a:r>
-              <a:rPr lang="nl-NL" sz="3600" b="1" err="1">
-                <a:latin typeface="Arial"/>
-                <a:cs typeface="Arial"/>
-              </a:rPr>
-              <a:t>and</a:t>
-            </a:r>
-            <a:r>
-              <a:rPr lang="nl-NL" sz="3600" b="1">
-                <a:latin typeface="Arial"/>
-                <a:cs typeface="Arial"/>
-              </a:rPr>
-              <a:t> real-time </a:t>
-            </a:r>
-            <a:r>
-              <a:rPr lang="nl-NL" sz="3600" b="1" err="1">
-                <a:latin typeface="Arial"/>
-                <a:cs typeface="Arial"/>
-              </a:rPr>
-              <a:t>implementation</a:t>
-            </a:r>
-            <a:r>
-              <a:rPr lang="nl-NL" sz="3600" b="1">
-                <a:latin typeface="Arial"/>
-                <a:cs typeface="Arial"/>
-              </a:rPr>
-              <a:t>. </a:t>
-            </a:r>
-          </a:p>
-          <a:p>
-            <a:pPr algn="just" eaLnBrk="1" hangingPunct="1"/>
-            <a:r>
-              <a:rPr lang="nl-NL" sz="3600" b="1">
+            <a:r>
+              <a:rPr lang="nl-NL" sz="3600" b="1" dirty="0">
                 <a:latin typeface="Arial"/>
                 <a:cs typeface="Arial"/>
               </a:rPr>
@@ -4862,7 +4013,7 @@
           </a:p>
           <a:p>
             <a:pPr algn="just" eaLnBrk="1" hangingPunct="1"/>
-            <a:endParaRPr lang="en-GB" sz="3600" b="1">
+            <a:endParaRPr lang="en-GB" sz="3600" b="1" dirty="0">
               <a:latin typeface="Arial"/>
               <a:cs typeface="Arial"/>
             </a:endParaRPr>
@@ -10064,21 +9215,6 @@
 </file>
 
 <file path=customXml/item1.xml><?xml version="1.0" encoding="utf-8"?>
-<?mso-contentType ?>
-<FormTemplates xmlns="http://schemas.microsoft.com/sharepoint/v3/contenttype/forms">
-  <Display>DocumentLibraryForm</Display>
-  <Edit>DocumentLibraryForm</Edit>
-  <New>DocumentLibraryForm</New>
-</FormTemplates>
-</file>
-
-<file path=customXml/item2.xml><?xml version="1.0" encoding="utf-8"?>
-<p:properties xmlns:p="http://schemas.microsoft.com/office/2006/metadata/properties" xmlns:xsi="http://www.w3.org/2001/XMLSchema-instance" xmlns:pc="http://schemas.microsoft.com/office/infopath/2007/PartnerControls">
-  <documentManagement/>
-</p:properties>
-</file>
-
-<file path=customXml/item3.xml><?xml version="1.0" encoding="utf-8"?>
 <ct:contentTypeSchema xmlns:ct="http://schemas.microsoft.com/office/2006/metadata/contentType" xmlns:ma="http://schemas.microsoft.com/office/2006/metadata/properties/metaAttributes" ct:_="" ma:_="" ma:contentTypeName="Document" ma:contentTypeID="0x01010031E2C10D4DF96D4A99B7393019D09280" ma:contentTypeVersion="3" ma:contentTypeDescription="Create a new document." ma:contentTypeScope="" ma:versionID="4f7b275aada892d1abd2c76871aa83aa">
   <xsd:schema xmlns:xsd="http://www.w3.org/2001/XMLSchema" xmlns:xs="http://www.w3.org/2001/XMLSchema" xmlns:p="http://schemas.microsoft.com/office/2006/metadata/properties" xmlns:ns2="234a9ece-d39b-497c-8472-0efdb3ce01dc" targetNamespace="http://schemas.microsoft.com/office/2006/metadata/properties" ma:root="true" ma:fieldsID="1fcf26e1d3e13ca48cc75a2d24ab3345" ns2:_="">
     <xsd:import namespace="234a9ece-d39b-497c-8472-0efdb3ce01dc"/>
@@ -10216,10 +9352,35 @@
 </ct:contentTypeSchema>
 </file>
 
+<file path=customXml/item2.xml><?xml version="1.0" encoding="utf-8"?>
+<p:properties xmlns:p="http://schemas.microsoft.com/office/2006/metadata/properties" xmlns:xsi="http://www.w3.org/2001/XMLSchema-instance" xmlns:pc="http://schemas.microsoft.com/office/infopath/2007/PartnerControls">
+  <documentManagement/>
+</p:properties>
+</file>
+
+<file path=customXml/item3.xml><?xml version="1.0" encoding="utf-8"?>
+<?mso-contentType ?>
+<FormTemplates xmlns="http://schemas.microsoft.com/sharepoint/v3/contenttype/forms">
+  <Display>DocumentLibraryForm</Display>
+  <Edit>DocumentLibraryForm</Edit>
+  <New>DocumentLibraryForm</New>
+</FormTemplates>
+</file>
+
 <file path=customXml/itemProps1.xml><?xml version="1.0" encoding="utf-8"?>
-<ds:datastoreItem xmlns:ds="http://schemas.openxmlformats.org/officeDocument/2006/customXml" ds:itemID="{261D33AA-E680-4A2D-A63E-427152794233}">
+<ds:datastoreItem xmlns:ds="http://schemas.openxmlformats.org/officeDocument/2006/customXml" ds:itemID="{F22A7A99-6B8B-413E-86C1-387AD0B2D0EC}">
   <ds:schemaRefs>
-    <ds:schemaRef ds:uri="http://schemas.microsoft.com/sharepoint/v3/contenttype/forms"/>
+    <ds:schemaRef ds:uri="234a9ece-d39b-497c-8472-0efdb3ce01dc"/>
+    <ds:schemaRef ds:uri="http://purl.org/dc/elements/1.1/"/>
+    <ds:schemaRef ds:uri="http://purl.org/dc/terms/"/>
+    <ds:schemaRef ds:uri="http://schemas.microsoft.com/internal/obd"/>
+    <ds:schemaRef ds:uri="http://schemas.microsoft.com/office/2006/documentManagement/types"/>
+    <ds:schemaRef ds:uri="http://schemas.microsoft.com/office/2006/metadata/contentType"/>
+    <ds:schemaRef ds:uri="http://schemas.microsoft.com/office/2006/metadata/properties"/>
+    <ds:schemaRef ds:uri="http://schemas.microsoft.com/office/2006/metadata/properties/metaAttributes"/>
+    <ds:schemaRef ds:uri="http://schemas.microsoft.com/office/infopath/2007/PartnerControls"/>
+    <ds:schemaRef ds:uri="http://schemas.openxmlformats.org/package/2006/metadata/core-properties"/>
+    <ds:schemaRef ds:uri="http://www.w3.org/2001/XMLSchema"/>
   </ds:schemaRefs>
 </ds:datastoreItem>
 </file>
@@ -10242,19 +9403,9 @@
 </file>
 
 <file path=customXml/itemProps3.xml><?xml version="1.0" encoding="utf-8"?>
-<ds:datastoreItem xmlns:ds="http://schemas.openxmlformats.org/officeDocument/2006/customXml" ds:itemID="{F22A7A99-6B8B-413E-86C1-387AD0B2D0EC}">
+<ds:datastoreItem xmlns:ds="http://schemas.openxmlformats.org/officeDocument/2006/customXml" ds:itemID="{261D33AA-E680-4A2D-A63E-427152794233}">
   <ds:schemaRefs>
-    <ds:schemaRef ds:uri="234a9ece-d39b-497c-8472-0efdb3ce01dc"/>
-    <ds:schemaRef ds:uri="http://purl.org/dc/elements/1.1/"/>
-    <ds:schemaRef ds:uri="http://purl.org/dc/terms/"/>
-    <ds:schemaRef ds:uri="http://schemas.microsoft.com/internal/obd"/>
-    <ds:schemaRef ds:uri="http://schemas.microsoft.com/office/2006/documentManagement/types"/>
-    <ds:schemaRef ds:uri="http://schemas.microsoft.com/office/2006/metadata/contentType"/>
-    <ds:schemaRef ds:uri="http://schemas.microsoft.com/office/2006/metadata/properties"/>
-    <ds:schemaRef ds:uri="http://schemas.microsoft.com/office/2006/metadata/properties/metaAttributes"/>
-    <ds:schemaRef ds:uri="http://schemas.microsoft.com/office/infopath/2007/PartnerControls"/>
-    <ds:schemaRef ds:uri="http://schemas.openxmlformats.org/package/2006/metadata/core-properties"/>
-    <ds:schemaRef ds:uri="http://www.w3.org/2001/XMLSchema"/>
+    <ds:schemaRef ds:uri="http://schemas.microsoft.com/sharepoint/v3/contenttype/forms"/>
   </ds:schemaRefs>
 </ds:datastoreItem>
 </file>
</xml_diff>